<commit_message>
slight change to powerpoint...
</commit_message>
<xml_diff>
--- a/documentation/figures/da_figure.pptx
+++ b/documentation/figures/da_figure.pptx
@@ -261,7 +261,7 @@
           <a:p>
             <a:fld id="{68642349-DBF8-4179-964C-0B6155F5F251}" type="datetimeFigureOut">
               <a:rPr lang="en-US" smtClean="0"/>
-              <a:t>5/31/2021</a:t>
+              <a:t>6/5/2021</a:t>
             </a:fld>
             <a:endParaRPr lang="en-US"/>
           </a:p>
@@ -459,7 +459,7 @@
           <a:p>
             <a:fld id="{68642349-DBF8-4179-964C-0B6155F5F251}" type="datetimeFigureOut">
               <a:rPr lang="en-US" smtClean="0"/>
-              <a:t>5/31/2021</a:t>
+              <a:t>6/5/2021</a:t>
             </a:fld>
             <a:endParaRPr lang="en-US"/>
           </a:p>
@@ -667,7 +667,7 @@
           <a:p>
             <a:fld id="{68642349-DBF8-4179-964C-0B6155F5F251}" type="datetimeFigureOut">
               <a:rPr lang="en-US" smtClean="0"/>
-              <a:t>5/31/2021</a:t>
+              <a:t>6/5/2021</a:t>
             </a:fld>
             <a:endParaRPr lang="en-US"/>
           </a:p>
@@ -865,7 +865,7 @@
           <a:p>
             <a:fld id="{68642349-DBF8-4179-964C-0B6155F5F251}" type="datetimeFigureOut">
               <a:rPr lang="en-US" smtClean="0"/>
-              <a:t>5/31/2021</a:t>
+              <a:t>6/5/2021</a:t>
             </a:fld>
             <a:endParaRPr lang="en-US"/>
           </a:p>
@@ -1140,7 +1140,7 @@
           <a:p>
             <a:fld id="{68642349-DBF8-4179-964C-0B6155F5F251}" type="datetimeFigureOut">
               <a:rPr lang="en-US" smtClean="0"/>
-              <a:t>5/31/2021</a:t>
+              <a:t>6/5/2021</a:t>
             </a:fld>
             <a:endParaRPr lang="en-US"/>
           </a:p>
@@ -1405,7 +1405,7 @@
           <a:p>
             <a:fld id="{68642349-DBF8-4179-964C-0B6155F5F251}" type="datetimeFigureOut">
               <a:rPr lang="en-US" smtClean="0"/>
-              <a:t>5/31/2021</a:t>
+              <a:t>6/5/2021</a:t>
             </a:fld>
             <a:endParaRPr lang="en-US"/>
           </a:p>
@@ -1817,7 +1817,7 @@
           <a:p>
             <a:fld id="{68642349-DBF8-4179-964C-0B6155F5F251}" type="datetimeFigureOut">
               <a:rPr lang="en-US" smtClean="0"/>
-              <a:t>5/31/2021</a:t>
+              <a:t>6/5/2021</a:t>
             </a:fld>
             <a:endParaRPr lang="en-US"/>
           </a:p>
@@ -1958,7 +1958,7 @@
           <a:p>
             <a:fld id="{68642349-DBF8-4179-964C-0B6155F5F251}" type="datetimeFigureOut">
               <a:rPr lang="en-US" smtClean="0"/>
-              <a:t>5/31/2021</a:t>
+              <a:t>6/5/2021</a:t>
             </a:fld>
             <a:endParaRPr lang="en-US"/>
           </a:p>
@@ -2071,7 +2071,7 @@
           <a:p>
             <a:fld id="{68642349-DBF8-4179-964C-0B6155F5F251}" type="datetimeFigureOut">
               <a:rPr lang="en-US" smtClean="0"/>
-              <a:t>5/31/2021</a:t>
+              <a:t>6/5/2021</a:t>
             </a:fld>
             <a:endParaRPr lang="en-US"/>
           </a:p>
@@ -2382,7 +2382,7 @@
           <a:p>
             <a:fld id="{68642349-DBF8-4179-964C-0B6155F5F251}" type="datetimeFigureOut">
               <a:rPr lang="en-US" smtClean="0"/>
-              <a:t>5/31/2021</a:t>
+              <a:t>6/5/2021</a:t>
             </a:fld>
             <a:endParaRPr lang="en-US"/>
           </a:p>
@@ -2670,7 +2670,7 @@
           <a:p>
             <a:fld id="{68642349-DBF8-4179-964C-0B6155F5F251}" type="datetimeFigureOut">
               <a:rPr lang="en-US" smtClean="0"/>
-              <a:t>5/31/2021</a:t>
+              <a:t>6/5/2021</a:t>
             </a:fld>
             <a:endParaRPr lang="en-US"/>
           </a:p>
@@ -2911,7 +2911,7 @@
           <a:p>
             <a:fld id="{68642349-DBF8-4179-964C-0B6155F5F251}" type="datetimeFigureOut">
               <a:rPr lang="en-US" smtClean="0"/>
-              <a:t>5/31/2021</a:t>
+              <a:t>6/5/2021</a:t>
             </a:fld>
             <a:endParaRPr lang="en-US"/>
           </a:p>

</xml_diff>